<commit_message>
Novo conteduo para os Alunos
</commit_message>
<xml_diff>
--- a/TECNOLOGIAS PARA INTERNET II/SLIDES/TI-2_Aula_03.pptx
+++ b/TECNOLOGIAS PARA INTERNET II/SLIDES/TI-2_Aula_03.pptx
@@ -12044,10 +12044,9 @@
           <a:lstStyle/>
           <a:p>
             <a:r>
-              <a:rPr lang="pt-BR"/>
+              <a:rPr lang="pt-BR" dirty="0"/>
               <a:t>Tecnologias para Internet - II  -  Prof.  André L. Braga</a:t>
             </a:r>
-            <a:endParaRPr lang="pt-BR" dirty="0"/>
           </a:p>
         </p:txBody>
       </p:sp>
@@ -12644,7 +12643,21 @@
                 <a:latin typeface="Courier New" panose="02070309020205020404" pitchFamily="49" charset="0"/>
                 <a:cs typeface="Courier New" panose="02070309020205020404" pitchFamily="49" charset="0"/>
               </a:rPr>
-              <a:t>();</a:t>
+              <a:t>(); </a:t>
+            </a:r>
+            <a:r>
+              <a:rPr lang="en-US" sz="2800" dirty="0" err="1">
+                <a:latin typeface="Courier New" panose="02070309020205020404" pitchFamily="49" charset="0"/>
+                <a:cs typeface="Courier New" panose="02070309020205020404" pitchFamily="49" charset="0"/>
+              </a:rPr>
+              <a:t>Obs</a:t>
+            </a:r>
+            <a:r>
+              <a:rPr lang="en-US" sz="2800" dirty="0">
+                <a:latin typeface="Courier New" panose="02070309020205020404" pitchFamily="49" charset="0"/>
+                <a:cs typeface="Courier New" panose="02070309020205020404" pitchFamily="49" charset="0"/>
+              </a:rPr>
+              <a:t>: para inputs</a:t>
             </a:r>
             <a:endParaRPr lang="pt-BR" sz="1600" dirty="0"/>
           </a:p>
@@ -12852,7 +12865,7 @@
         <p:spPr>
           <a:xfrm>
             <a:off x="204787" y="1227663"/>
-            <a:ext cx="12215813" cy="5493812"/>
+            <a:ext cx="12215813" cy="5801588"/>
           </a:xfrm>
           <a:prstGeom prst="rect">
             <a:avLst/>
@@ -13400,8 +13413,13 @@
             </a:pPr>
             <a:r>
               <a:rPr lang="en-US" sz="2800" b="1" dirty="0"/>
-              <a:t>$this</a:t>
-            </a:r>
+              <a:t>$this </a:t>
+            </a:r>
+            <a:r>
+              <a:rPr lang="en-US" sz="2800" b="1"/>
+              <a:t>(obs.)</a:t>
+            </a:r>
+            <a:endParaRPr lang="en-US" sz="2800" b="1" dirty="0"/>
           </a:p>
           <a:p>
             <a:pPr marL="742950" lvl="1" indent="-285750">
@@ -13423,7 +13441,7 @@
                 <a:latin typeface="Courier New" panose="02070309020205020404" pitchFamily="49" charset="0"/>
                 <a:cs typeface="Courier New" panose="02070309020205020404" pitchFamily="49" charset="0"/>
               </a:rPr>
-              <a:t>($this</a:t>
+              <a:t>(this</a:t>
             </a:r>
             <a:r>
               <a:rPr lang="en-US" sz="2800" dirty="0">
@@ -13487,6 +13505,20 @@
               </a:rPr>
               <a:t>escopo</a:t>
             </a:r>
+            <a:endParaRPr lang="en-US" sz="2800" b="1" dirty="0">
+              <a:solidFill>
+                <a:srgbClr val="6600FF"/>
+              </a:solidFill>
+              <a:latin typeface="Courier New" panose="02070309020205020404" pitchFamily="49" charset="0"/>
+              <a:cs typeface="Courier New" panose="02070309020205020404" pitchFamily="49" charset="0"/>
+              <a:sym typeface="Wingdings" panose="05000000000000000000" pitchFamily="2" charset="2"/>
+            </a:endParaRPr>
+          </a:p>
+          <a:p>
+            <a:pPr marL="742950" lvl="1" indent="-285750">
+              <a:buFont typeface="Arial" panose="020B0604020202020204" pitchFamily="34" charset="0"/>
+              <a:buChar char="•"/>
+            </a:pPr>
             <a:endParaRPr lang="en-US" sz="2000" b="1" dirty="0"/>
           </a:p>
           <a:p>

</xml_diff>